<commit_message>
Web App and Script Access Update
</commit_message>
<xml_diff>
--- a/Presentation/Email and Roster Manager.pptx
+++ b/Presentation/Email and Roster Manager.pptx
@@ -131,7 +131,7 @@
   <pc:docChgLst>
     <pc:chgData name="Shelby Womack" userId="ad7a5156cd3203ca" providerId="LiveId" clId="{EC62061A-80C7-47AA-AD29-6CEE5135B2BE}"/>
     <pc:docChg chg="undo redo custSel addSld delSld modSld sldOrd modMainMaster">
-      <pc:chgData name="Shelby Womack" userId="ad7a5156cd3203ca" providerId="LiveId" clId="{EC62061A-80C7-47AA-AD29-6CEE5135B2BE}" dt="2024-04-24T17:57:48.606" v="2307" actId="1076"/>
+      <pc:chgData name="Shelby Womack" userId="ad7a5156cd3203ca" providerId="LiveId" clId="{EC62061A-80C7-47AA-AD29-6CEE5135B2BE}" dt="2024-04-24T20:19:05.746" v="2308" actId="20577"/>
       <pc:docMkLst>
         <pc:docMk/>
       </pc:docMkLst>
@@ -221,7 +221,7 @@
         </pc:spChg>
       </pc:sldChg>
       <pc:sldChg chg="modSp new mod setBg">
-        <pc:chgData name="Shelby Womack" userId="ad7a5156cd3203ca" providerId="LiveId" clId="{EC62061A-80C7-47AA-AD29-6CEE5135B2BE}" dt="2024-04-24T17:27:09.158" v="1778" actId="20577"/>
+        <pc:chgData name="Shelby Womack" userId="ad7a5156cd3203ca" providerId="LiveId" clId="{EC62061A-80C7-47AA-AD29-6CEE5135B2BE}" dt="2024-04-24T20:19:05.746" v="2308" actId="20577"/>
         <pc:sldMkLst>
           <pc:docMk/>
           <pc:sldMk cId="1095713568" sldId="259"/>
@@ -235,7 +235,7 @@
           </ac:spMkLst>
         </pc:spChg>
         <pc:spChg chg="mod">
-          <ac:chgData name="Shelby Womack" userId="ad7a5156cd3203ca" providerId="LiveId" clId="{EC62061A-80C7-47AA-AD29-6CEE5135B2BE}" dt="2024-04-24T17:27:09.158" v="1778" actId="20577"/>
+          <ac:chgData name="Shelby Womack" userId="ad7a5156cd3203ca" providerId="LiveId" clId="{EC62061A-80C7-47AA-AD29-6CEE5135B2BE}" dt="2024-04-24T20:19:05.746" v="2308" actId="20577"/>
           <ac:spMkLst>
             <pc:docMk/>
             <pc:sldMk cId="1095713568" sldId="259"/>
@@ -6739,13 +6739,18 @@
           </a:p>
           <a:p>
             <a:r>
-              <a:rPr lang="en-US" sz="2400" dirty="0">
+              <a:rPr lang="en-US" sz="2400">
                 <a:solidFill>
                   <a:schemeClr val="tx1"/>
                 </a:solidFill>
               </a:rPr>
-              <a:t>Authentication:</a:t>
-            </a:r>
+              <a:t>Authentication</a:t>
+            </a:r>
+            <a:endParaRPr lang="en-US" sz="2400" dirty="0">
+              <a:solidFill>
+                <a:schemeClr val="tx1"/>
+              </a:solidFill>
+            </a:endParaRPr>
           </a:p>
           <a:p>
             <a:r>

</xml_diff>

<commit_message>
Update Email and Roster Manager.pptx
</commit_message>
<xml_diff>
--- a/Presentation/Email and Roster Manager.pptx
+++ b/Presentation/Email and Roster Manager.pptx
@@ -131,7 +131,7 @@
   <pc:docChgLst>
     <pc:chgData name="Shelby Womack" userId="ad7a5156cd3203ca" providerId="LiveId" clId="{EC62061A-80C7-47AA-AD29-6CEE5135B2BE}"/>
     <pc:docChg chg="undo redo custSel addSld delSld modSld sldOrd modMainMaster">
-      <pc:chgData name="Shelby Womack" userId="ad7a5156cd3203ca" providerId="LiveId" clId="{EC62061A-80C7-47AA-AD29-6CEE5135B2BE}" dt="2024-04-25T17:08:42.621" v="2346" actId="27636"/>
+      <pc:chgData name="Shelby Womack" userId="ad7a5156cd3203ca" providerId="LiveId" clId="{EC62061A-80C7-47AA-AD29-6CEE5135B2BE}" dt="2024-04-29T18:27:07.507" v="2362" actId="20577"/>
       <pc:docMkLst>
         <pc:docMk/>
       </pc:docMkLst>
@@ -221,7 +221,7 @@
         </pc:spChg>
       </pc:sldChg>
       <pc:sldChg chg="modSp new mod setBg">
-        <pc:chgData name="Shelby Womack" userId="ad7a5156cd3203ca" providerId="LiveId" clId="{EC62061A-80C7-47AA-AD29-6CEE5135B2BE}" dt="2024-04-24T20:19:05.746" v="2308" actId="20577"/>
+        <pc:chgData name="Shelby Womack" userId="ad7a5156cd3203ca" providerId="LiveId" clId="{EC62061A-80C7-47AA-AD29-6CEE5135B2BE}" dt="2024-04-29T18:27:07.507" v="2362" actId="20577"/>
         <pc:sldMkLst>
           <pc:docMk/>
           <pc:sldMk cId="1095713568" sldId="259"/>
@@ -235,7 +235,7 @@
           </ac:spMkLst>
         </pc:spChg>
         <pc:spChg chg="mod">
-          <ac:chgData name="Shelby Womack" userId="ad7a5156cd3203ca" providerId="LiveId" clId="{EC62061A-80C7-47AA-AD29-6CEE5135B2BE}" dt="2024-04-24T20:19:05.746" v="2308" actId="20577"/>
+          <ac:chgData name="Shelby Womack" userId="ad7a5156cd3203ca" providerId="LiveId" clId="{EC62061A-80C7-47AA-AD29-6CEE5135B2BE}" dt="2024-04-29T18:27:07.507" v="2362" actId="20577"/>
           <ac:spMkLst>
             <pc:docMk/>
             <pc:sldMk cId="1095713568" sldId="259"/>
@@ -626,7 +626,7 @@
           <a:p>
             <a:fld id="{732EEB44-E32F-4EDD-9550-1B249E681FA6}" type="datetimeFigureOut">
               <a:rPr lang="en-US" smtClean="0"/>
-              <a:t>4/25/2024</a:t>
+              <a:t>4/29/2024</a:t>
             </a:fld>
             <a:endParaRPr lang="en-US"/>
           </a:p>
@@ -1062,7 +1062,7 @@
           <a:p>
             <a:fld id="{732EEB44-E32F-4EDD-9550-1B249E681FA6}" type="datetimeFigureOut">
               <a:rPr lang="en-US" smtClean="0"/>
-              <a:t>4/25/2024</a:t>
+              <a:t>4/29/2024</a:t>
             </a:fld>
             <a:endParaRPr lang="en-US"/>
           </a:p>
@@ -1312,7 +1312,7 @@
           <a:p>
             <a:fld id="{732EEB44-E32F-4EDD-9550-1B249E681FA6}" type="datetimeFigureOut">
               <a:rPr lang="en-US" smtClean="0"/>
-              <a:t>4/25/2024</a:t>
+              <a:t>4/29/2024</a:t>
             </a:fld>
             <a:endParaRPr lang="en-US"/>
           </a:p>
@@ -1620,7 +1620,7 @@
           <a:p>
             <a:fld id="{732EEB44-E32F-4EDD-9550-1B249E681FA6}" type="datetimeFigureOut">
               <a:rPr lang="en-US" smtClean="0"/>
-              <a:t>4/25/2024</a:t>
+              <a:t>4/29/2024</a:t>
             </a:fld>
             <a:endParaRPr lang="en-US"/>
           </a:p>
@@ -1938,7 +1938,7 @@
           <a:p>
             <a:fld id="{732EEB44-E32F-4EDD-9550-1B249E681FA6}" type="datetimeFigureOut">
               <a:rPr lang="en-US" smtClean="0"/>
-              <a:t>4/25/2024</a:t>
+              <a:t>4/29/2024</a:t>
             </a:fld>
             <a:endParaRPr lang="en-US"/>
           </a:p>
@@ -2240,7 +2240,7 @@
           <a:p>
             <a:fld id="{732EEB44-E32F-4EDD-9550-1B249E681FA6}" type="datetimeFigureOut">
               <a:rPr lang="en-US" smtClean="0"/>
-              <a:t>4/25/2024</a:t>
+              <a:t>4/29/2024</a:t>
             </a:fld>
             <a:endParaRPr lang="en-US"/>
           </a:p>
@@ -2607,7 +2607,7 @@
           <a:p>
             <a:fld id="{732EEB44-E32F-4EDD-9550-1B249E681FA6}" type="datetimeFigureOut">
               <a:rPr lang="en-US" smtClean="0"/>
-              <a:t>4/25/2024</a:t>
+              <a:t>4/29/2024</a:t>
             </a:fld>
             <a:endParaRPr lang="en-US"/>
           </a:p>
@@ -2781,7 +2781,7 @@
           <a:p>
             <a:fld id="{732EEB44-E32F-4EDD-9550-1B249E681FA6}" type="datetimeFigureOut">
               <a:rPr lang="en-US" smtClean="0"/>
-              <a:t>4/25/2024</a:t>
+              <a:t>4/29/2024</a:t>
             </a:fld>
             <a:endParaRPr lang="en-US"/>
           </a:p>
@@ -2961,7 +2961,7 @@
           <a:p>
             <a:fld id="{732EEB44-E32F-4EDD-9550-1B249E681FA6}" type="datetimeFigureOut">
               <a:rPr lang="en-US" smtClean="0"/>
-              <a:t>4/25/2024</a:t>
+              <a:t>4/29/2024</a:t>
             </a:fld>
             <a:endParaRPr lang="en-US"/>
           </a:p>
@@ -3131,7 +3131,7 @@
           <a:p>
             <a:fld id="{732EEB44-E32F-4EDD-9550-1B249E681FA6}" type="datetimeFigureOut">
               <a:rPr lang="en-US" smtClean="0"/>
-              <a:t>4/25/2024</a:t>
+              <a:t>4/29/2024</a:t>
             </a:fld>
             <a:endParaRPr lang="en-US"/>
           </a:p>
@@ -3381,7 +3381,7 @@
           <a:p>
             <a:fld id="{732EEB44-E32F-4EDD-9550-1B249E681FA6}" type="datetimeFigureOut">
               <a:rPr lang="en-US" smtClean="0"/>
-              <a:t>4/25/2024</a:t>
+              <a:t>4/29/2024</a:t>
             </a:fld>
             <a:endParaRPr lang="en-US"/>
           </a:p>
@@ -3617,7 +3617,7 @@
           <a:p>
             <a:fld id="{732EEB44-E32F-4EDD-9550-1B249E681FA6}" type="datetimeFigureOut">
               <a:rPr lang="en-US" smtClean="0"/>
-              <a:t>4/25/2024</a:t>
+              <a:t>4/29/2024</a:t>
             </a:fld>
             <a:endParaRPr lang="en-US"/>
           </a:p>
@@ -3999,7 +3999,7 @@
           <a:p>
             <a:fld id="{732EEB44-E32F-4EDD-9550-1B249E681FA6}" type="datetimeFigureOut">
               <a:rPr lang="en-US" smtClean="0"/>
-              <a:t>4/25/2024</a:t>
+              <a:t>4/29/2024</a:t>
             </a:fld>
             <a:endParaRPr lang="en-US"/>
           </a:p>
@@ -4117,7 +4117,7 @@
           <a:p>
             <a:fld id="{732EEB44-E32F-4EDD-9550-1B249E681FA6}" type="datetimeFigureOut">
               <a:rPr lang="en-US" smtClean="0"/>
-              <a:t>4/25/2024</a:t>
+              <a:t>4/29/2024</a:t>
             </a:fld>
             <a:endParaRPr lang="en-US"/>
           </a:p>
@@ -4212,7 +4212,7 @@
           <a:p>
             <a:fld id="{732EEB44-E32F-4EDD-9550-1B249E681FA6}" type="datetimeFigureOut">
               <a:rPr lang="en-US" smtClean="0"/>
-              <a:t>4/25/2024</a:t>
+              <a:t>4/29/2024</a:t>
             </a:fld>
             <a:endParaRPr lang="en-US"/>
           </a:p>
@@ -4467,7 +4467,7 @@
           <a:p>
             <a:fld id="{732EEB44-E32F-4EDD-9550-1B249E681FA6}" type="datetimeFigureOut">
               <a:rPr lang="en-US" smtClean="0"/>
-              <a:t>4/25/2024</a:t>
+              <a:t>4/29/2024</a:t>
             </a:fld>
             <a:endParaRPr lang="en-US"/>
           </a:p>
@@ -4750,7 +4750,7 @@
           <a:p>
             <a:fld id="{732EEB44-E32F-4EDD-9550-1B249E681FA6}" type="datetimeFigureOut">
               <a:rPr lang="en-US" smtClean="0"/>
-              <a:t>4/25/2024</a:t>
+              <a:t>4/29/2024</a:t>
             </a:fld>
             <a:endParaRPr lang="en-US"/>
           </a:p>
@@ -5156,7 +5156,7 @@
           <a:p>
             <a:fld id="{732EEB44-E32F-4EDD-9550-1B249E681FA6}" type="datetimeFigureOut">
               <a:rPr lang="en-US" smtClean="0"/>
-              <a:t>4/25/2024</a:t>
+              <a:t>4/29/2024</a:t>
             </a:fld>
             <a:endParaRPr lang="en-US"/>
           </a:p>
@@ -6739,68 +6739,48 @@
           </a:p>
           <a:p>
             <a:r>
-              <a:rPr lang="en-US" sz="2400">
+              <a:rPr lang="en-US" sz="2400" dirty="0">
                 <a:solidFill>
                   <a:schemeClr val="tx1"/>
                 </a:solidFill>
               </a:rPr>
               <a:t>Authentication</a:t>
+            </a:r>
+          </a:p>
+          <a:p>
+            <a:r>
+              <a:rPr lang="en-US" sz="2400" dirty="0">
+                <a:solidFill>
+                  <a:schemeClr val="tx1"/>
+                </a:solidFill>
+              </a:rPr>
+              <a:t>Gmail API  </a:t>
+            </a:r>
+          </a:p>
+          <a:p>
+            <a:r>
+              <a:rPr lang="en-US" sz="2400" dirty="0">
+                <a:solidFill>
+                  <a:schemeClr val="tx1"/>
+                </a:solidFill>
+              </a:rPr>
+              <a:t>Automation</a:t>
+            </a:r>
+          </a:p>
+          <a:p>
+            <a:r>
+              <a:rPr lang="en-US" sz="2400">
+                <a:solidFill>
+                  <a:schemeClr val="tx1"/>
+                </a:solidFill>
+              </a:rPr>
+              <a:t>Processing</a:t>
             </a:r>
             <a:endParaRPr lang="en-US" sz="2400" dirty="0">
               <a:solidFill>
                 <a:schemeClr val="tx1"/>
               </a:solidFill>
             </a:endParaRPr>
-          </a:p>
-          <a:p>
-            <a:r>
-              <a:rPr lang="en-US" sz="2400" dirty="0">
-                <a:solidFill>
-                  <a:schemeClr val="tx1"/>
-                </a:solidFill>
-              </a:rPr>
-              <a:t>Gmail API  </a:t>
-            </a:r>
-          </a:p>
-          <a:p>
-            <a:r>
-              <a:rPr lang="en-US" sz="2400" dirty="0">
-                <a:solidFill>
-                  <a:schemeClr val="tx1"/>
-                </a:solidFill>
-              </a:rPr>
-              <a:t>Parsing</a:t>
-            </a:r>
-          </a:p>
-          <a:p>
-            <a:r>
-              <a:rPr lang="en-US" sz="2400" dirty="0">
-                <a:solidFill>
-                  <a:schemeClr val="tx1"/>
-                </a:solidFill>
-              </a:rPr>
-              <a:t>Processing</a:t>
-            </a:r>
-          </a:p>
-          <a:p>
-            <a:r>
-              <a:rPr lang="en-US" sz="2400" dirty="0">
-                <a:solidFill>
-                  <a:schemeClr val="tx1"/>
-                </a:solidFill>
-              </a:rPr>
-              <a:t>Integration</a:t>
-            </a:r>
-          </a:p>
-          <a:p>
-            <a:r>
-              <a:rPr lang="en-US" sz="2400" dirty="0">
-                <a:solidFill>
-                  <a:schemeClr val="tx1"/>
-                </a:solidFill>
-              </a:rPr>
-              <a:t>Automation</a:t>
-            </a:r>
           </a:p>
           <a:p>
             <a:r>

</xml_diff>